<commit_message>
Session 01 - Finish slides & update website
</commit_message>
<xml_diff>
--- a/slides/img/session-01/graphics_16_9.pptx
+++ b/slides/img/session-01/graphics_16_9.pptx
@@ -5,11 +5,13 @@
     <p:sldMasterId id="2147483648" r:id="rId1"/>
   </p:sldMasterIdLst>
   <p:notesMasterIdLst>
-    <p:notesMasterId r:id="rId4"/>
+    <p:notesMasterId r:id="rId6"/>
   </p:notesMasterIdLst>
   <p:sldIdLst>
     <p:sldId id="257" r:id="rId2"/>
-    <p:sldId id="258" r:id="rId3"/>
+    <p:sldId id="260" r:id="rId3"/>
+    <p:sldId id="261" r:id="rId4"/>
+    <p:sldId id="262" r:id="rId5"/>
   </p:sldIdLst>
   <p:sldSz cx="12192000" cy="6858000"/>
   <p:notesSz cx="6858000" cy="9144000"/>
@@ -198,7 +200,7 @@
           <a:p>
             <a:fld id="{9E7D78CA-C3B5-B64F-AEEF-BB3F0CC59486}" type="datetimeFigureOut">
               <a:rPr lang="de-DE" smtClean="0"/>
-              <a:t>23.10.23</a:t>
+              <a:t>24.10.23</a:t>
             </a:fld>
             <a:endParaRPr lang="de-DE"/>
           </a:p>
@@ -696,7 +698,7 @@
           <a:p>
             <a:fld id="{05844293-2F53-DD49-A051-D1C1CF164266}" type="datetimeFigureOut">
               <a:rPr lang="de-DE" smtClean="0"/>
-              <a:t>23.10.23</a:t>
+              <a:t>24.10.23</a:t>
             </a:fld>
             <a:endParaRPr lang="de-DE"/>
           </a:p>
@@ -894,7 +896,7 @@
           <a:p>
             <a:fld id="{05844293-2F53-DD49-A051-D1C1CF164266}" type="datetimeFigureOut">
               <a:rPr lang="de-DE" smtClean="0"/>
-              <a:t>23.10.23</a:t>
+              <a:t>24.10.23</a:t>
             </a:fld>
             <a:endParaRPr lang="de-DE"/>
           </a:p>
@@ -1102,7 +1104,7 @@
           <a:p>
             <a:fld id="{05844293-2F53-DD49-A051-D1C1CF164266}" type="datetimeFigureOut">
               <a:rPr lang="de-DE" smtClean="0"/>
-              <a:t>23.10.23</a:t>
+              <a:t>24.10.23</a:t>
             </a:fld>
             <a:endParaRPr lang="de-DE"/>
           </a:p>
@@ -1300,7 +1302,7 @@
           <a:p>
             <a:fld id="{05844293-2F53-DD49-A051-D1C1CF164266}" type="datetimeFigureOut">
               <a:rPr lang="de-DE" smtClean="0"/>
-              <a:t>23.10.23</a:t>
+              <a:t>24.10.23</a:t>
             </a:fld>
             <a:endParaRPr lang="de-DE"/>
           </a:p>
@@ -1575,7 +1577,7 @@
           <a:p>
             <a:fld id="{05844293-2F53-DD49-A051-D1C1CF164266}" type="datetimeFigureOut">
               <a:rPr lang="de-DE" smtClean="0"/>
-              <a:t>23.10.23</a:t>
+              <a:t>24.10.23</a:t>
             </a:fld>
             <a:endParaRPr lang="de-DE"/>
           </a:p>
@@ -1840,7 +1842,7 @@
           <a:p>
             <a:fld id="{05844293-2F53-DD49-A051-D1C1CF164266}" type="datetimeFigureOut">
               <a:rPr lang="de-DE" smtClean="0"/>
-              <a:t>23.10.23</a:t>
+              <a:t>24.10.23</a:t>
             </a:fld>
             <a:endParaRPr lang="de-DE"/>
           </a:p>
@@ -2252,7 +2254,7 @@
           <a:p>
             <a:fld id="{05844293-2F53-DD49-A051-D1C1CF164266}" type="datetimeFigureOut">
               <a:rPr lang="de-DE" smtClean="0"/>
-              <a:t>23.10.23</a:t>
+              <a:t>24.10.23</a:t>
             </a:fld>
             <a:endParaRPr lang="de-DE"/>
           </a:p>
@@ -2393,7 +2395,7 @@
           <a:p>
             <a:fld id="{05844293-2F53-DD49-A051-D1C1CF164266}" type="datetimeFigureOut">
               <a:rPr lang="de-DE" smtClean="0"/>
-              <a:t>23.10.23</a:t>
+              <a:t>24.10.23</a:t>
             </a:fld>
             <a:endParaRPr lang="de-DE"/>
           </a:p>
@@ -2506,7 +2508,7 @@
           <a:p>
             <a:fld id="{05844293-2F53-DD49-A051-D1C1CF164266}" type="datetimeFigureOut">
               <a:rPr lang="de-DE" smtClean="0"/>
-              <a:t>23.10.23</a:t>
+              <a:t>24.10.23</a:t>
             </a:fld>
             <a:endParaRPr lang="de-DE"/>
           </a:p>
@@ -2817,7 +2819,7 @@
           <a:p>
             <a:fld id="{05844293-2F53-DD49-A051-D1C1CF164266}" type="datetimeFigureOut">
               <a:rPr lang="de-DE" smtClean="0"/>
-              <a:t>23.10.23</a:t>
+              <a:t>24.10.23</a:t>
             </a:fld>
             <a:endParaRPr lang="de-DE"/>
           </a:p>
@@ -3105,7 +3107,7 @@
           <a:p>
             <a:fld id="{05844293-2F53-DD49-A051-D1C1CF164266}" type="datetimeFigureOut">
               <a:rPr lang="de-DE" smtClean="0"/>
-              <a:t>23.10.23</a:t>
+              <a:t>24.10.23</a:t>
             </a:fld>
             <a:endParaRPr lang="de-DE"/>
           </a:p>
@@ -3346,7 +3348,7 @@
           <a:p>
             <a:fld id="{05844293-2F53-DD49-A051-D1C1CF164266}" type="datetimeFigureOut">
               <a:rPr lang="de-DE" smtClean="0"/>
-              <a:t>23.10.23</a:t>
+              <a:t>24.10.23</a:t>
             </a:fld>
             <a:endParaRPr lang="de-DE"/>
           </a:p>
@@ -3976,7 +3978,7 @@
         <p:spPr>
           <a:xfrm>
             <a:off x="924952" y="6090067"/>
-            <a:ext cx="1838965" cy="584775"/>
+            <a:ext cx="1326004" cy="584775"/>
           </a:xfrm>
           <a:prstGeom prst="rect">
             <a:avLst/>
@@ -3990,11 +3992,11 @@
           <a:lstStyle/>
           <a:p>
             <a:r>
-              <a:rPr lang="de-DE" dirty="0">
+              <a:rPr lang="de-DE" b="1" dirty="0">
                 <a:solidFill>
                   <a:srgbClr val="971B2F"/>
                 </a:solidFill>
-                <a:latin typeface="Noto Mono for Powerline" panose="020B0609030804020204" pitchFamily="49" charset="0"/>
+                <a:latin typeface="News Cycle" panose="02000503000000000000" pitchFamily="2" charset="2"/>
                 <a:ea typeface="Noto Mono for Powerline" panose="020B0609030804020204" pitchFamily="49" charset="0"/>
                 <a:cs typeface="Noto Mono for Powerline" panose="020B0609030804020204" pitchFamily="49" charset="0"/>
               </a:rPr>
@@ -4005,7 +4007,7 @@
                 <a:solidFill>
                   <a:srgbClr val="971B2F"/>
                 </a:solidFill>
-                <a:latin typeface="Noto Mono for Powerline" panose="020B0609030804020204" pitchFamily="49" charset="0"/>
+                <a:latin typeface="News Cycle" panose="02000503000000000000" pitchFamily="2" charset="2"/>
                 <a:ea typeface="Noto Mono for Powerline" panose="020B0609030804020204" pitchFamily="49" charset="0"/>
                 <a:cs typeface="Noto Mono for Powerline" panose="020B0609030804020204" pitchFamily="49" charset="0"/>
               </a:rPr>
@@ -4015,7 +4017,7 @@
                 <a:solidFill>
                   <a:srgbClr val="971B2F"/>
                 </a:solidFill>
-                <a:latin typeface="Noto Mono for Powerline" panose="020B0609030804020204" pitchFamily="49" charset="0"/>
+                <a:latin typeface="News Cycle" panose="02000503000000000000" pitchFamily="2" charset="2"/>
                 <a:ea typeface="Noto Mono for Powerline" panose="020B0609030804020204" pitchFamily="49" charset="0"/>
                 <a:cs typeface="Noto Mono for Powerline" panose="020B0609030804020204" pitchFamily="49" charset="0"/>
               </a:rPr>
@@ -4025,7 +4027,7 @@
               <a:solidFill>
                 <a:srgbClr val="971B2F"/>
               </a:solidFill>
-              <a:latin typeface="Noto Mono for Powerline" panose="020B0609030804020204" pitchFamily="49" charset="0"/>
+              <a:latin typeface="News Cycle" panose="02000503000000000000" pitchFamily="2" charset="2"/>
               <a:ea typeface="Noto Mono for Powerline" panose="020B0609030804020204" pitchFamily="49" charset="0"/>
               <a:cs typeface="Noto Mono for Powerline" panose="020B0609030804020204" pitchFamily="49" charset="0"/>
             </a:endParaRPr>
@@ -4046,8 +4048,8 @@
         </p:nvSpPr>
         <p:spPr>
           <a:xfrm>
-            <a:off x="8269600" y="3923334"/>
-            <a:ext cx="2396810" cy="677108"/>
+            <a:off x="8616895" y="3914641"/>
+            <a:ext cx="1636987" cy="677108"/>
           </a:xfrm>
           <a:prstGeom prst="rect">
             <a:avLst/>
@@ -4061,32 +4063,32 @@
           <a:lstStyle/>
           <a:p>
             <a:r>
-              <a:rPr lang="de-DE" sz="2400" dirty="0">
+              <a:rPr lang="de-DE" sz="2400" b="1" dirty="0">
                 <a:solidFill>
                   <a:srgbClr val="AA2C3D"/>
                 </a:solidFill>
-                <a:latin typeface="Noto Mono for Powerline" panose="020B0609030804020204" pitchFamily="49" charset="0"/>
+                <a:latin typeface="News Cycle" panose="02000503000000000000" pitchFamily="2" charset="2"/>
                 <a:ea typeface="Noto Mono for Powerline" panose="020B0609030804020204" pitchFamily="49" charset="0"/>
                 <a:cs typeface="Noto Mono for Powerline" panose="020B0609030804020204" pitchFamily="49" charset="0"/>
               </a:rPr>
               <a:t>Short </a:t>
             </a:r>
             <a:r>
-              <a:rPr lang="de-DE" sz="2400" dirty="0" err="1">
+              <a:rPr lang="de-DE" sz="2400" b="1" dirty="0" err="1">
                 <a:solidFill>
                   <a:srgbClr val="AA2C3D"/>
                 </a:solidFill>
-                <a:latin typeface="Noto Mono for Powerline" panose="020B0609030804020204" pitchFamily="49" charset="0"/>
+                <a:latin typeface="News Cycle" panose="02000503000000000000" pitchFamily="2" charset="2"/>
                 <a:ea typeface="Noto Mono for Powerline" panose="020B0609030804020204" pitchFamily="49" charset="0"/>
                 <a:cs typeface="Noto Mono for Powerline" panose="020B0609030804020204" pitchFamily="49" charset="0"/>
               </a:rPr>
               <a:t>report</a:t>
             </a:r>
-            <a:endParaRPr lang="de-DE" sz="2400" dirty="0">
+            <a:endParaRPr lang="de-DE" sz="2400" b="1" dirty="0">
               <a:solidFill>
                 <a:srgbClr val="AA2C3D"/>
               </a:solidFill>
-              <a:latin typeface="Noto Mono for Powerline" panose="020B0609030804020204" pitchFamily="49" charset="0"/>
+              <a:latin typeface="News Cycle" panose="02000503000000000000" pitchFamily="2" charset="2"/>
               <a:ea typeface="Noto Mono for Powerline" panose="020B0609030804020204" pitchFamily="49" charset="0"/>
               <a:cs typeface="Noto Mono for Powerline" panose="020B0609030804020204" pitchFamily="49" charset="0"/>
             </a:endParaRPr>
@@ -4103,7 +4105,7 @@
                 <a:effectLst/>
                 <a:uLnTx/>
                 <a:uFillTx/>
-                <a:latin typeface="Noto Mono for Powerline" panose="020B0609030804020204" pitchFamily="49" charset="0"/>
+                <a:latin typeface="News Cycle" panose="02000503000000000000" pitchFamily="2" charset="2"/>
                 <a:ea typeface="Noto Mono for Powerline" panose="020B0609030804020204" pitchFamily="49" charset="0"/>
                 <a:cs typeface="Noto Mono for Powerline" panose="020B0609030804020204" pitchFamily="49" charset="0"/>
               </a:rPr>
@@ -4113,7 +4115,7 @@
               <a:solidFill>
                 <a:srgbClr val="AA2C3D"/>
               </a:solidFill>
-              <a:latin typeface="Arial" panose="020B0604020202020204" pitchFamily="34" charset="0"/>
+              <a:latin typeface="News Cycle" panose="02000503000000000000" pitchFamily="2" charset="2"/>
               <a:cs typeface="Arial" panose="020B0604020202020204" pitchFamily="34" charset="0"/>
             </a:endParaRPr>
           </a:p>
@@ -4260,7 +4262,7 @@
         <p:spPr>
           <a:xfrm>
             <a:off x="3312411" y="4066877"/>
-            <a:ext cx="1287532" cy="1138773"/>
+            <a:ext cx="1390124" cy="861774"/>
           </a:xfrm>
           <a:prstGeom prst="rect">
             <a:avLst/>
@@ -4274,98 +4276,96 @@
           <a:lstStyle/>
           <a:p>
             <a:r>
-              <a:rPr lang="de-DE" dirty="0">
+              <a:rPr lang="de-DE" b="1" dirty="0">
                 <a:solidFill>
                   <a:srgbClr val="971B2F"/>
                 </a:solidFill>
-                <a:latin typeface="Noto Mono for Powerline" panose="020B0609030804020204" pitchFamily="49" charset="0"/>
+                <a:latin typeface="News Cycle" panose="02000503000000000000" pitchFamily="2" charset="2"/>
                 <a:ea typeface="Noto Mono for Powerline" panose="020B0609030804020204" pitchFamily="49" charset="0"/>
                 <a:cs typeface="Noto Mono for Powerline" panose="020B0609030804020204" pitchFamily="49" charset="0"/>
               </a:rPr>
               <a:t>Project </a:t>
             </a:r>
-          </a:p>
-          <a:p>
-            <a:r>
-              <a:rPr lang="de-DE" dirty="0" err="1">
+            <a:r>
+              <a:rPr lang="de-DE" b="1" dirty="0" err="1">
                 <a:solidFill>
                   <a:srgbClr val="971B2F"/>
                 </a:solidFill>
-                <a:latin typeface="Noto Mono for Powerline" panose="020B0609030804020204" pitchFamily="49" charset="0"/>
+                <a:latin typeface="News Cycle" panose="02000503000000000000" pitchFamily="2" charset="2"/>
                 <a:ea typeface="Noto Mono for Powerline" panose="020B0609030804020204" pitchFamily="49" charset="0"/>
                 <a:cs typeface="Noto Mono for Powerline" panose="020B0609030804020204" pitchFamily="49" charset="0"/>
               </a:rPr>
               <a:t>topic</a:t>
             </a:r>
             <a:r>
-              <a:rPr lang="de-DE" dirty="0">
+              <a:rPr lang="de-DE" b="1" dirty="0">
                 <a:solidFill>
                   <a:srgbClr val="971B2F"/>
                 </a:solidFill>
-                <a:latin typeface="Noto Mono for Powerline" panose="020B0609030804020204" pitchFamily="49" charset="0"/>
+                <a:latin typeface="News Cycle" panose="02000503000000000000" pitchFamily="2" charset="2"/>
                 <a:ea typeface="Noto Mono for Powerline" panose="020B0609030804020204" pitchFamily="49" charset="0"/>
                 <a:cs typeface="Noto Mono for Powerline" panose="020B0609030804020204" pitchFamily="49" charset="0"/>
               </a:rPr>
               <a:t> </a:t>
+            </a:r>
+            <a:br>
+              <a:rPr lang="de-DE" b="1" dirty="0">
+                <a:solidFill>
+                  <a:srgbClr val="971B2F"/>
+                </a:solidFill>
+                <a:latin typeface="News Cycle" panose="02000503000000000000" pitchFamily="2" charset="2"/>
+                <a:ea typeface="Noto Mono for Powerline" panose="020B0609030804020204" pitchFamily="49" charset="0"/>
+                <a:cs typeface="Noto Mono for Powerline" panose="020B0609030804020204" pitchFamily="49" charset="0"/>
+              </a:rPr>
+            </a:br>
+            <a:r>
+              <a:rPr lang="de-DE" b="1" dirty="0" err="1">
+                <a:solidFill>
+                  <a:srgbClr val="971B2F"/>
+                </a:solidFill>
+                <a:latin typeface="News Cycle" panose="02000503000000000000" pitchFamily="2" charset="2"/>
+                <a:ea typeface="Noto Mono for Powerline" panose="020B0609030804020204" pitchFamily="49" charset="0"/>
+                <a:cs typeface="Noto Mono for Powerline" panose="020B0609030804020204" pitchFamily="49" charset="0"/>
+              </a:rPr>
+              <a:t>idea</a:t>
+            </a:r>
+            <a:r>
+              <a:rPr lang="de-DE" b="1" dirty="0">
+                <a:solidFill>
+                  <a:srgbClr val="971B2F"/>
+                </a:solidFill>
+                <a:latin typeface="News Cycle" panose="02000503000000000000" pitchFamily="2" charset="2"/>
+                <a:ea typeface="Noto Mono for Powerline" panose="020B0609030804020204" pitchFamily="49" charset="0"/>
+                <a:cs typeface="Noto Mono for Powerline" panose="020B0609030804020204" pitchFamily="49" charset="0"/>
+              </a:rPr>
+              <a:t>(s)</a:t>
             </a:r>
             <a:br>
               <a:rPr lang="de-DE" dirty="0">
                 <a:solidFill>
                   <a:srgbClr val="971B2F"/>
                 </a:solidFill>
-                <a:latin typeface="Noto Mono for Powerline" panose="020B0609030804020204" pitchFamily="49" charset="0"/>
+                <a:latin typeface="News Cycle" panose="02000503000000000000" pitchFamily="2" charset="2"/>
                 <a:ea typeface="Noto Mono for Powerline" panose="020B0609030804020204" pitchFamily="49" charset="0"/>
                 <a:cs typeface="Noto Mono for Powerline" panose="020B0609030804020204" pitchFamily="49" charset="0"/>
               </a:rPr>
             </a:br>
             <a:r>
-              <a:rPr lang="de-DE" dirty="0" err="1">
-                <a:solidFill>
-                  <a:srgbClr val="971B2F"/>
-                </a:solidFill>
-                <a:latin typeface="Noto Mono for Powerline" panose="020B0609030804020204" pitchFamily="49" charset="0"/>
-                <a:ea typeface="Noto Mono for Powerline" panose="020B0609030804020204" pitchFamily="49" charset="0"/>
-                <a:cs typeface="Noto Mono for Powerline" panose="020B0609030804020204" pitchFamily="49" charset="0"/>
-              </a:rPr>
-              <a:t>idea</a:t>
-            </a:r>
-            <a:r>
-              <a:rPr lang="de-DE" dirty="0">
-                <a:solidFill>
-                  <a:srgbClr val="971B2F"/>
-                </a:solidFill>
-                <a:latin typeface="Noto Mono for Powerline" panose="020B0609030804020204" pitchFamily="49" charset="0"/>
-                <a:ea typeface="Noto Mono for Powerline" panose="020B0609030804020204" pitchFamily="49" charset="0"/>
-                <a:cs typeface="Noto Mono for Powerline" panose="020B0609030804020204" pitchFamily="49" charset="0"/>
-              </a:rPr>
-              <a:t>(s)</a:t>
-            </a:r>
-            <a:br>
-              <a:rPr lang="de-DE" dirty="0">
-                <a:solidFill>
-                  <a:srgbClr val="971B2F"/>
-                </a:solidFill>
-                <a:latin typeface="Noto Mono for Powerline" panose="020B0609030804020204" pitchFamily="49" charset="0"/>
-                <a:ea typeface="Noto Mono for Powerline" panose="020B0609030804020204" pitchFamily="49" charset="0"/>
-                <a:cs typeface="Noto Mono for Powerline" panose="020B0609030804020204" pitchFamily="49" charset="0"/>
-              </a:rPr>
-            </a:br>
-            <a:r>
               <a:rPr lang="de-DE" sz="1400" dirty="0">
                 <a:solidFill>
                   <a:srgbClr val="971B2F"/>
                 </a:solidFill>
-                <a:latin typeface="Noto Mono for Powerline" panose="020B0609030804020204" pitchFamily="49" charset="0"/>
+                <a:latin typeface="News Cycle" panose="02000503000000000000" pitchFamily="2" charset="2"/>
                 <a:ea typeface="Noto Mono for Powerline" panose="020B0609030804020204" pitchFamily="49" charset="0"/>
                 <a:cs typeface="Noto Mono for Powerline" panose="020B0609030804020204" pitchFamily="49" charset="0"/>
               </a:rPr>
-              <a:t>(20 Pkt.)</a:t>
+              <a:t>(10 Pkt.)</a:t>
             </a:r>
             <a:endParaRPr lang="de-DE" sz="1200" dirty="0">
               <a:solidFill>
                 <a:srgbClr val="971B2F"/>
               </a:solidFill>
-              <a:latin typeface="Noto Mono for Powerline" panose="020B0609030804020204" pitchFamily="49" charset="0"/>
+              <a:latin typeface="News Cycle" panose="02000503000000000000" pitchFamily="2" charset="2"/>
               <a:ea typeface="Noto Mono for Powerline" panose="020B0609030804020204" pitchFamily="49" charset="0"/>
               <a:cs typeface="Noto Mono for Powerline" panose="020B0609030804020204" pitchFamily="49" charset="0"/>
             </a:endParaRPr>
@@ -4386,8 +4386,8 @@
         </p:nvSpPr>
         <p:spPr>
           <a:xfrm>
-            <a:off x="5148437" y="3400114"/>
-            <a:ext cx="1287532" cy="861774"/>
+            <a:off x="5307935" y="3429000"/>
+            <a:ext cx="968535" cy="861774"/>
           </a:xfrm>
           <a:prstGeom prst="rect">
             <a:avLst/>
@@ -4401,11 +4401,11 @@
           <a:lstStyle/>
           <a:p>
             <a:r>
-              <a:rPr lang="de-DE" dirty="0">
+              <a:rPr lang="de-DE" b="1" dirty="0">
                 <a:solidFill>
                   <a:srgbClr val="971B2F"/>
                 </a:solidFill>
-                <a:latin typeface="Noto Mono for Powerline" panose="020B0609030804020204" pitchFamily="49" charset="0"/>
+                <a:latin typeface="News Cycle" panose="02000503000000000000" pitchFamily="2" charset="2"/>
                 <a:ea typeface="Noto Mono for Powerline" panose="020B0609030804020204" pitchFamily="49" charset="0"/>
                 <a:cs typeface="Noto Mono for Powerline" panose="020B0609030804020204" pitchFamily="49" charset="0"/>
               </a:rPr>
@@ -4414,11 +4414,11 @@
           </a:p>
           <a:p>
             <a:r>
-              <a:rPr lang="de-DE" dirty="0" err="1">
+              <a:rPr lang="de-DE" b="1" dirty="0" err="1">
                 <a:solidFill>
                   <a:srgbClr val="971B2F"/>
                 </a:solidFill>
-                <a:latin typeface="Noto Mono for Powerline" panose="020B0609030804020204" pitchFamily="49" charset="0"/>
+                <a:latin typeface="News Cycle" panose="02000503000000000000" pitchFamily="2" charset="2"/>
                 <a:ea typeface="Noto Mono for Powerline" panose="020B0609030804020204" pitchFamily="49" charset="0"/>
                 <a:cs typeface="Noto Mono for Powerline" panose="020B0609030804020204" pitchFamily="49" charset="0"/>
               </a:rPr>
@@ -4429,7 +4429,7 @@
                 <a:solidFill>
                   <a:srgbClr val="971B2F"/>
                 </a:solidFill>
-                <a:latin typeface="Noto Mono for Powerline" panose="020B0609030804020204" pitchFamily="49" charset="0"/>
+                <a:latin typeface="News Cycle" panose="02000503000000000000" pitchFamily="2" charset="2"/>
                 <a:ea typeface="Noto Mono for Powerline" panose="020B0609030804020204" pitchFamily="49" charset="0"/>
                 <a:cs typeface="Noto Mono for Powerline" panose="020B0609030804020204" pitchFamily="49" charset="0"/>
               </a:rPr>
@@ -4439,7 +4439,7 @@
                 <a:solidFill>
                   <a:srgbClr val="971B2F"/>
                 </a:solidFill>
-                <a:latin typeface="Noto Mono for Powerline" panose="020B0609030804020204" pitchFamily="49" charset="0"/>
+                <a:latin typeface="News Cycle" panose="02000503000000000000" pitchFamily="2" charset="2"/>
                 <a:ea typeface="Noto Mono for Powerline" panose="020B0609030804020204" pitchFamily="49" charset="0"/>
                 <a:cs typeface="Noto Mono for Powerline" panose="020B0609030804020204" pitchFamily="49" charset="0"/>
               </a:rPr>
@@ -4449,7 +4449,7 @@
               <a:solidFill>
                 <a:srgbClr val="971B2F"/>
               </a:solidFill>
-              <a:latin typeface="Noto Mono for Powerline" panose="020B0609030804020204" pitchFamily="49" charset="0"/>
+              <a:latin typeface="News Cycle" panose="02000503000000000000" pitchFamily="2" charset="2"/>
               <a:ea typeface="Noto Mono for Powerline" panose="020B0609030804020204" pitchFamily="49" charset="0"/>
               <a:cs typeface="Noto Mono for Powerline" panose="020B0609030804020204" pitchFamily="49" charset="0"/>
             </a:endParaRPr>
@@ -4579,7 +4579,7 @@
         <p:spPr>
           <a:xfrm>
             <a:off x="6647272" y="507233"/>
-            <a:ext cx="1151277" cy="861774"/>
+            <a:ext cx="1295547" cy="584775"/>
           </a:xfrm>
           <a:prstGeom prst="rect">
             <a:avLst/>
@@ -4593,35 +4593,22 @@
           <a:lstStyle/>
           <a:p>
             <a:r>
-              <a:rPr lang="de-DE" dirty="0">
+              <a:rPr lang="de-DE" b="1" dirty="0">
                 <a:solidFill>
                   <a:srgbClr val="971B2F"/>
                 </a:solidFill>
-                <a:latin typeface="Noto Mono for Powerline" panose="020B0609030804020204" pitchFamily="49" charset="0"/>
+                <a:latin typeface="News Cycle" panose="02000503000000000000" pitchFamily="2" charset="2"/>
                 <a:ea typeface="Noto Mono for Powerline" panose="020B0609030804020204" pitchFamily="49" charset="0"/>
                 <a:cs typeface="Noto Mono for Powerline" panose="020B0609030804020204" pitchFamily="49" charset="0"/>
               </a:rPr>
-              <a:t>Peer</a:t>
-            </a:r>
-          </a:p>
-          <a:p>
-            <a:r>
-              <a:rPr lang="de-DE" dirty="0">
-                <a:solidFill>
-                  <a:srgbClr val="971B2F"/>
-                </a:solidFill>
-                <a:latin typeface="Noto Mono for Powerline" panose="020B0609030804020204" pitchFamily="49" charset="0"/>
-                <a:ea typeface="Noto Mono for Powerline" panose="020B0609030804020204" pitchFamily="49" charset="0"/>
-                <a:cs typeface="Noto Mono for Powerline" panose="020B0609030804020204" pitchFamily="49" charset="0"/>
-              </a:rPr>
-              <a:t>Review</a:t>
+              <a:t>Peer Review</a:t>
             </a:r>
             <a:br>
               <a:rPr lang="de-DE" dirty="0">
                 <a:solidFill>
                   <a:srgbClr val="971B2F"/>
                 </a:solidFill>
-                <a:latin typeface="Noto Mono for Powerline" panose="020B0609030804020204" pitchFamily="49" charset="0"/>
+                <a:latin typeface="News Cycle" panose="02000503000000000000" pitchFamily="2" charset="2"/>
                 <a:ea typeface="Noto Mono for Powerline" panose="020B0609030804020204" pitchFamily="49" charset="0"/>
                 <a:cs typeface="Noto Mono for Powerline" panose="020B0609030804020204" pitchFamily="49" charset="0"/>
               </a:rPr>
@@ -4631,7 +4618,7 @@
                 <a:solidFill>
                   <a:srgbClr val="971B2F"/>
                 </a:solidFill>
-                <a:latin typeface="Noto Mono for Powerline" panose="020B0609030804020204" pitchFamily="49" charset="0"/>
+                <a:latin typeface="News Cycle" panose="02000503000000000000" pitchFamily="2" charset="2"/>
                 <a:ea typeface="Noto Mono for Powerline" panose="020B0609030804020204" pitchFamily="49" charset="0"/>
                 <a:cs typeface="Noto Mono for Powerline" panose="020B0609030804020204" pitchFamily="49" charset="0"/>
               </a:rPr>
@@ -4641,7 +4628,7 @@
               <a:solidFill>
                 <a:srgbClr val="971B2F"/>
               </a:solidFill>
-              <a:latin typeface="Noto Mono for Powerline" panose="020B0609030804020204" pitchFamily="49" charset="0"/>
+              <a:latin typeface="News Cycle" panose="02000503000000000000" pitchFamily="2" charset="2"/>
               <a:ea typeface="Noto Mono for Powerline" panose="020B0609030804020204" pitchFamily="49" charset="0"/>
               <a:cs typeface="Noto Mono for Powerline" panose="020B0609030804020204" pitchFamily="49" charset="0"/>
             </a:endParaRPr>
@@ -4716,10 +4703,10 @@
       </p:grpSpPr>
       <p:sp>
         <p:nvSpPr>
-          <p:cNvPr id="4" name="Abgerundetes Rechteck 3">
-            <a:extLst>
-              <a:ext uri="{FF2B5EF4-FFF2-40B4-BE49-F238E27FC236}">
-                <a16:creationId xmlns:a16="http://schemas.microsoft.com/office/drawing/2014/main" id="{CD5587B9-DC04-764D-591C-A8C1D131A66D}"/>
+          <p:cNvPr id="5" name="Abgerundetes Rechteck 4">
+            <a:extLst>
+              <a:ext uri="{FF2B5EF4-FFF2-40B4-BE49-F238E27FC236}">
+                <a16:creationId xmlns:a16="http://schemas.microsoft.com/office/drawing/2014/main" id="{97576DE3-4156-F65A-E20F-559E90F065A9}"/>
               </a:ext>
             </a:extLst>
           </p:cNvPr>
@@ -4728,15 +4715,23 @@
         </p:nvSpPr>
         <p:spPr>
           <a:xfrm>
-            <a:off x="865954" y="1961267"/>
-            <a:ext cx="4614390" cy="2935466"/>
+            <a:off x="1423072" y="482469"/>
+            <a:ext cx="9000000" cy="5400000"/>
           </a:xfrm>
           <a:prstGeom prst="roundRect">
             <a:avLst/>
           </a:prstGeom>
-          <a:solidFill>
-            <a:srgbClr val="04316A"/>
-          </a:solidFill>
+          <a:gradFill>
+            <a:gsLst>
+              <a:gs pos="100000">
+                <a:srgbClr val="971B2F"/>
+              </a:gs>
+              <a:gs pos="0">
+                <a:srgbClr val="662938"/>
+              </a:gs>
+            </a:gsLst>
+            <a:lin ang="5400000" scaled="1"/>
+          </a:gradFill>
           <a:ln>
             <a:noFill/>
           </a:ln>
@@ -4762,10 +4757,70 @@
           <a:lstStyle/>
           <a:p>
             <a:pPr algn="ctr"/>
-            <a:endParaRPr lang="de-DE" dirty="0"/>
-          </a:p>
-        </p:txBody>
-      </p:sp>
+            <a:endParaRPr lang="de-DE"/>
+          </a:p>
+        </p:txBody>
+      </p:sp>
+      <p:pic>
+        <p:nvPicPr>
+          <p:cNvPr id="13" name="Grafik 12">
+            <a:extLst>
+              <a:ext uri="{FF2B5EF4-FFF2-40B4-BE49-F238E27FC236}">
+                <a16:creationId xmlns:a16="http://schemas.microsoft.com/office/drawing/2014/main" id="{8ED3A0A7-70AF-D3D3-8B63-4F1514C979A2}"/>
+              </a:ext>
+            </a:extLst>
+          </p:cNvPr>
+          <p:cNvPicPr>
+            <a:picLocks noChangeAspect="1"/>
+          </p:cNvPicPr>
+          <p:nvPr/>
+        </p:nvPicPr>
+        <p:blipFill>
+          <a:blip r:embed="rId2"/>
+          <a:stretch>
+            <a:fillRect/>
+          </a:stretch>
+        </p:blipFill>
+        <p:spPr>
+          <a:xfrm>
+            <a:off x="2172046" y="833108"/>
+            <a:ext cx="7847908" cy="4599194"/>
+          </a:xfrm>
+          <a:prstGeom prst="rect">
+            <a:avLst/>
+          </a:prstGeom>
+        </p:spPr>
+      </p:pic>
+    </p:spTree>
+    <p:extLst>
+      <p:ext uri="{BB962C8B-B14F-4D97-AF65-F5344CB8AC3E}">
+        <p14:creationId xmlns:p14="http://schemas.microsoft.com/office/powerpoint/2010/main" val="1781487082"/>
+      </p:ext>
+    </p:extLst>
+  </p:cSld>
+  <p:clrMapOvr>
+    <a:masterClrMapping/>
+  </p:clrMapOvr>
+</p:sld>
+</file>
+
+<file path=ppt/slides/slide3.xml><?xml version="1.0" encoding="utf-8"?>
+<p:sld xmlns:a="http://schemas.openxmlformats.org/drawingml/2006/main" xmlns:r="http://schemas.openxmlformats.org/officeDocument/2006/relationships" xmlns:p="http://schemas.openxmlformats.org/presentationml/2006/main">
+  <p:cSld>
+    <p:spTree>
+      <p:nvGrpSpPr>
+        <p:cNvPr id="1" name=""/>
+        <p:cNvGrpSpPr/>
+        <p:nvPr/>
+      </p:nvGrpSpPr>
+      <p:grpSpPr>
+        <a:xfrm>
+          <a:off x="0" y="0"/>
+          <a:ext cx="0" cy="0"/>
+          <a:chOff x="0" y="0"/>
+          <a:chExt cx="0" cy="0"/>
+        </a:xfrm>
+      </p:grpSpPr>
       <p:sp>
         <p:nvSpPr>
           <p:cNvPr id="5" name="Abgerundetes Rechteck 4">
@@ -4780,15 +4835,23 @@
         </p:nvSpPr>
         <p:spPr>
           <a:xfrm>
-            <a:off x="6548154" y="1961266"/>
-            <a:ext cx="4777892" cy="3014189"/>
+            <a:off x="1423072" y="482469"/>
+            <a:ext cx="9000000" cy="5400000"/>
           </a:xfrm>
           <a:prstGeom prst="roundRect">
             <a:avLst/>
           </a:prstGeom>
-          <a:solidFill>
-            <a:srgbClr val="AA2C3D"/>
-          </a:solidFill>
+          <a:gradFill>
+            <a:gsLst>
+              <a:gs pos="100000">
+                <a:srgbClr val="004A9F"/>
+              </a:gs>
+              <a:gs pos="0">
+                <a:srgbClr val="04316A"/>
+              </a:gs>
+            </a:gsLst>
+            <a:lin ang="5400000" scaled="1"/>
+          </a:gradFill>
           <a:ln>
             <a:noFill/>
           </a:ln>
@@ -4820,10 +4883,10 @@
       </p:sp>
       <p:pic>
         <p:nvPicPr>
-          <p:cNvPr id="13" name="Grafik 12">
-            <a:extLst>
-              <a:ext uri="{FF2B5EF4-FFF2-40B4-BE49-F238E27FC236}">
-                <a16:creationId xmlns:a16="http://schemas.microsoft.com/office/drawing/2014/main" id="{8ED3A0A7-70AF-D3D3-8B63-4F1514C979A2}"/>
+          <p:cNvPr id="2" name="Grafik 1">
+            <a:extLst>
+              <a:ext uri="{FF2B5EF4-FFF2-40B4-BE49-F238E27FC236}">
+                <a16:creationId xmlns:a16="http://schemas.microsoft.com/office/drawing/2014/main" id="{3F20FF00-6E76-1177-9A7C-C5C9419EA47C}"/>
               </a:ext>
             </a:extLst>
           </p:cNvPr>
@@ -4840,8 +4903,843 @@
         </p:blipFill>
         <p:spPr>
           <a:xfrm>
-            <a:off x="6967031" y="2205821"/>
-            <a:ext cx="4174382" cy="2446358"/>
+            <a:off x="2626274" y="482469"/>
+            <a:ext cx="6593595" cy="5400000"/>
+          </a:xfrm>
+          <a:prstGeom prst="rect">
+            <a:avLst/>
+          </a:prstGeom>
+          <a:noFill/>
+        </p:spPr>
+      </p:pic>
+    </p:spTree>
+    <p:extLst>
+      <p:ext uri="{BB962C8B-B14F-4D97-AF65-F5344CB8AC3E}">
+        <p14:creationId xmlns:p14="http://schemas.microsoft.com/office/powerpoint/2010/main" val="1627393312"/>
+      </p:ext>
+    </p:extLst>
+  </p:cSld>
+  <p:clrMapOvr>
+    <a:masterClrMapping/>
+  </p:clrMapOvr>
+</p:sld>
+</file>
+
+<file path=ppt/slides/slide4.xml><?xml version="1.0" encoding="utf-8"?>
+<p:sld xmlns:a="http://schemas.openxmlformats.org/drawingml/2006/main" xmlns:r="http://schemas.openxmlformats.org/officeDocument/2006/relationships" xmlns:p="http://schemas.openxmlformats.org/presentationml/2006/main">
+  <p:cSld>
+    <p:spTree>
+      <p:nvGrpSpPr>
+        <p:cNvPr id="1" name=""/>
+        <p:cNvGrpSpPr/>
+        <p:nvPr/>
+      </p:nvGrpSpPr>
+      <p:grpSpPr>
+        <a:xfrm>
+          <a:off x="0" y="0"/>
+          <a:ext cx="0" cy="0"/>
+          <a:chOff x="0" y="0"/>
+          <a:chExt cx="0" cy="0"/>
+        </a:xfrm>
+      </p:grpSpPr>
+      <p:sp>
+        <p:nvSpPr>
+          <p:cNvPr id="3" name="Abgerundetes Rechteck 2">
+            <a:extLst>
+              <a:ext uri="{FF2B5EF4-FFF2-40B4-BE49-F238E27FC236}">
+                <a16:creationId xmlns:a16="http://schemas.microsoft.com/office/drawing/2014/main" id="{CDC85E87-DEF9-8D79-E676-F21FB7AE3C13}"/>
+              </a:ext>
+            </a:extLst>
+          </p:cNvPr>
+          <p:cNvSpPr/>
+          <p:nvPr/>
+        </p:nvSpPr>
+        <p:spPr>
+          <a:xfrm>
+            <a:off x="110394" y="367410"/>
+            <a:ext cx="3780000" cy="5220000"/>
+          </a:xfrm>
+          <a:prstGeom prst="roundRect">
+            <a:avLst/>
+          </a:prstGeom>
+          <a:solidFill>
+            <a:srgbClr val="662938"/>
+          </a:solidFill>
+          <a:ln>
+            <a:noFill/>
+          </a:ln>
+          <a:effectLst>
+            <a:outerShdw blurRad="50800" dist="38100" dir="2700000" algn="tl" rotWithShape="0">
+              <a:prstClr val="black">
+                <a:alpha val="40000"/>
+              </a:prstClr>
+            </a:outerShdw>
+          </a:effectLst>
+        </p:spPr>
+        <p:style>
+          <a:lnRef idx="2">
+            <a:schemeClr val="accent1">
+              <a:shade val="15000"/>
+            </a:schemeClr>
+          </a:lnRef>
+          <a:fillRef idx="1">
+            <a:schemeClr val="accent1"/>
+          </a:fillRef>
+          <a:effectRef idx="0">
+            <a:schemeClr val="accent1"/>
+          </a:effectRef>
+          <a:fontRef idx="minor">
+            <a:schemeClr val="lt1"/>
+          </a:fontRef>
+        </p:style>
+        <p:txBody>
+          <a:bodyPr rtlCol="0" anchor="ctr"/>
+          <a:lstStyle/>
+          <a:p>
+            <a:pPr algn="ctr"/>
+            <a:endParaRPr lang="de-DE" dirty="0"/>
+          </a:p>
+        </p:txBody>
+      </p:sp>
+      <p:sp>
+        <p:nvSpPr>
+          <p:cNvPr id="6" name="Abgerundetes Rechteck 5">
+            <a:extLst>
+              <a:ext uri="{FF2B5EF4-FFF2-40B4-BE49-F238E27FC236}">
+                <a16:creationId xmlns:a16="http://schemas.microsoft.com/office/drawing/2014/main" id="{E011DA0B-D83A-8FAE-C781-2BD0379A0231}"/>
+              </a:ext>
+            </a:extLst>
+          </p:cNvPr>
+          <p:cNvSpPr/>
+          <p:nvPr/>
+        </p:nvSpPr>
+        <p:spPr>
+          <a:xfrm>
+            <a:off x="8301606" y="367410"/>
+            <a:ext cx="3780000" cy="5220000"/>
+          </a:xfrm>
+          <a:prstGeom prst="roundRect">
+            <a:avLst/>
+          </a:prstGeom>
+          <a:solidFill>
+            <a:srgbClr val="C50F3C"/>
+          </a:solidFill>
+          <a:ln>
+            <a:noFill/>
+          </a:ln>
+          <a:effectLst>
+            <a:outerShdw blurRad="50800" dist="38100" dir="2700000" algn="tl" rotWithShape="0">
+              <a:prstClr val="black">
+                <a:alpha val="40000"/>
+              </a:prstClr>
+            </a:outerShdw>
+          </a:effectLst>
+        </p:spPr>
+        <p:style>
+          <a:lnRef idx="2">
+            <a:schemeClr val="accent1">
+              <a:shade val="15000"/>
+            </a:schemeClr>
+          </a:lnRef>
+          <a:fillRef idx="1">
+            <a:schemeClr val="accent1"/>
+          </a:fillRef>
+          <a:effectRef idx="0">
+            <a:schemeClr val="accent1"/>
+          </a:effectRef>
+          <a:fontRef idx="minor">
+            <a:schemeClr val="lt1"/>
+          </a:fontRef>
+        </p:style>
+        <p:txBody>
+          <a:bodyPr rtlCol="0" anchor="ctr"/>
+          <a:lstStyle/>
+          <a:p>
+            <a:pPr algn="ctr"/>
+            <a:endParaRPr lang="de-DE"/>
+          </a:p>
+        </p:txBody>
+      </p:sp>
+      <p:sp>
+        <p:nvSpPr>
+          <p:cNvPr id="7" name="Abgerundetes Rechteck 6">
+            <a:extLst>
+              <a:ext uri="{FF2B5EF4-FFF2-40B4-BE49-F238E27FC236}">
+                <a16:creationId xmlns:a16="http://schemas.microsoft.com/office/drawing/2014/main" id="{1D80AB3C-49CE-520B-581B-6637612A4C4A}"/>
+              </a:ext>
+            </a:extLst>
+          </p:cNvPr>
+          <p:cNvSpPr/>
+          <p:nvPr/>
+        </p:nvSpPr>
+        <p:spPr>
+          <a:xfrm>
+            <a:off x="4206000" y="367410"/>
+            <a:ext cx="3780000" cy="5220000"/>
+          </a:xfrm>
+          <a:prstGeom prst="roundRect">
+            <a:avLst/>
+          </a:prstGeom>
+          <a:solidFill>
+            <a:srgbClr val="AA2C3D"/>
+          </a:solidFill>
+          <a:ln>
+            <a:noFill/>
+          </a:ln>
+          <a:effectLst>
+            <a:outerShdw blurRad="50800" dist="38100" dir="2700000" algn="tl" rotWithShape="0">
+              <a:prstClr val="black">
+                <a:alpha val="40000"/>
+              </a:prstClr>
+            </a:outerShdw>
+          </a:effectLst>
+        </p:spPr>
+        <p:style>
+          <a:lnRef idx="2">
+            <a:schemeClr val="accent1">
+              <a:shade val="15000"/>
+            </a:schemeClr>
+          </a:lnRef>
+          <a:fillRef idx="1">
+            <a:schemeClr val="accent1"/>
+          </a:fillRef>
+          <a:effectRef idx="0">
+            <a:schemeClr val="accent1"/>
+          </a:effectRef>
+          <a:fontRef idx="minor">
+            <a:schemeClr val="lt1"/>
+          </a:fontRef>
+        </p:style>
+        <p:txBody>
+          <a:bodyPr rtlCol="0" anchor="ctr"/>
+          <a:lstStyle/>
+          <a:p>
+            <a:pPr algn="ctr"/>
+            <a:endParaRPr lang="de-DE"/>
+          </a:p>
+        </p:txBody>
+      </p:sp>
+      <p:sp>
+        <p:nvSpPr>
+          <p:cNvPr id="8" name="Textfeld 7">
+            <a:extLst>
+              <a:ext uri="{FF2B5EF4-FFF2-40B4-BE49-F238E27FC236}">
+                <a16:creationId xmlns:a16="http://schemas.microsoft.com/office/drawing/2014/main" id="{264EED66-DD17-2F25-AF49-9D0F18643B3A}"/>
+              </a:ext>
+            </a:extLst>
+          </p:cNvPr>
+          <p:cNvSpPr txBox="1"/>
+          <p:nvPr/>
+        </p:nvSpPr>
+        <p:spPr>
+          <a:xfrm>
+            <a:off x="413819" y="684286"/>
+            <a:ext cx="3056055" cy="1046440"/>
+          </a:xfrm>
+          <a:prstGeom prst="rect">
+            <a:avLst/>
+          </a:prstGeom>
+          <a:noFill/>
+        </p:spPr>
+        <p:txBody>
+          <a:bodyPr wrap="square" rtlCol="0">
+            <a:spAutoFit/>
+          </a:bodyPr>
+          <a:lstStyle/>
+          <a:p>
+            <a:r>
+              <a:rPr lang="de-DE" sz="4400" b="1" dirty="0">
+                <a:solidFill>
+                  <a:schemeClr val="bg1"/>
+                </a:solidFill>
+                <a:latin typeface="News Cycle" panose="02000503000000000000" pitchFamily="2" charset="2"/>
+              </a:rPr>
+              <a:t>Einführung</a:t>
+            </a:r>
+          </a:p>
+          <a:p>
+            <a:endParaRPr lang="de-DE" dirty="0">
+              <a:latin typeface="News Cycle" panose="02000503000000000000" pitchFamily="2" charset="2"/>
+            </a:endParaRPr>
+          </a:p>
+        </p:txBody>
+      </p:sp>
+      <p:sp>
+        <p:nvSpPr>
+          <p:cNvPr id="9" name="Textfeld 8">
+            <a:extLst>
+              <a:ext uri="{FF2B5EF4-FFF2-40B4-BE49-F238E27FC236}">
+                <a16:creationId xmlns:a16="http://schemas.microsoft.com/office/drawing/2014/main" id="{5C453801-784E-D79A-AA5C-B326A324E38F}"/>
+              </a:ext>
+            </a:extLst>
+          </p:cNvPr>
+          <p:cNvSpPr txBox="1"/>
+          <p:nvPr/>
+        </p:nvSpPr>
+        <p:spPr>
+          <a:xfrm>
+            <a:off x="4821381" y="684286"/>
+            <a:ext cx="2802645" cy="769441"/>
+          </a:xfrm>
+          <a:prstGeom prst="rect">
+            <a:avLst/>
+          </a:prstGeom>
+          <a:noFill/>
+        </p:spPr>
+        <p:txBody>
+          <a:bodyPr wrap="square" rtlCol="0">
+            <a:spAutoFit/>
+          </a:bodyPr>
+          <a:lstStyle/>
+          <a:p>
+            <a:r>
+              <a:rPr lang="de-DE" sz="4400" b="1" dirty="0">
+                <a:solidFill>
+                  <a:schemeClr val="bg1"/>
+                </a:solidFill>
+                <a:latin typeface="News Cycle" panose="02000503000000000000" pitchFamily="2" charset="2"/>
+              </a:rPr>
+              <a:t>Projekt 1</a:t>
+            </a:r>
+          </a:p>
+        </p:txBody>
+      </p:sp>
+      <p:sp>
+        <p:nvSpPr>
+          <p:cNvPr id="10" name="Textfeld 9">
+            <a:extLst>
+              <a:ext uri="{FF2B5EF4-FFF2-40B4-BE49-F238E27FC236}">
+                <a16:creationId xmlns:a16="http://schemas.microsoft.com/office/drawing/2014/main" id="{0CEE59BD-104D-2855-99A9-C71A74BBB2B3}"/>
+              </a:ext>
+            </a:extLst>
+          </p:cNvPr>
+          <p:cNvSpPr txBox="1"/>
+          <p:nvPr/>
+        </p:nvSpPr>
+        <p:spPr>
+          <a:xfrm>
+            <a:off x="8894618" y="689127"/>
+            <a:ext cx="2817080" cy="769441"/>
+          </a:xfrm>
+          <a:prstGeom prst="rect">
+            <a:avLst/>
+          </a:prstGeom>
+          <a:noFill/>
+        </p:spPr>
+        <p:txBody>
+          <a:bodyPr wrap="square" rtlCol="0">
+            <a:spAutoFit/>
+          </a:bodyPr>
+          <a:lstStyle/>
+          <a:p>
+            <a:r>
+              <a:rPr lang="de-DE" sz="4400" b="1" dirty="0">
+                <a:solidFill>
+                  <a:schemeClr val="bg1"/>
+                </a:solidFill>
+                <a:latin typeface="News Cycle" panose="02000503000000000000" pitchFamily="2" charset="2"/>
+              </a:rPr>
+              <a:t>Projekt 2</a:t>
+            </a:r>
+            <a:endParaRPr lang="de-DE" dirty="0">
+              <a:latin typeface="News Cycle" panose="02000503000000000000" pitchFamily="2" charset="2"/>
+            </a:endParaRPr>
+          </a:p>
+        </p:txBody>
+      </p:sp>
+      <p:sp>
+        <p:nvSpPr>
+          <p:cNvPr id="11" name="Textfeld 10">
+            <a:extLst>
+              <a:ext uri="{FF2B5EF4-FFF2-40B4-BE49-F238E27FC236}">
+                <a16:creationId xmlns:a16="http://schemas.microsoft.com/office/drawing/2014/main" id="{032C460A-EA36-1E2A-6628-9EA884B5A6BF}"/>
+              </a:ext>
+            </a:extLst>
+          </p:cNvPr>
+          <p:cNvSpPr txBox="1"/>
+          <p:nvPr/>
+        </p:nvSpPr>
+        <p:spPr>
+          <a:xfrm>
+            <a:off x="472368" y="1930503"/>
+            <a:ext cx="3056055" cy="2862322"/>
+          </a:xfrm>
+          <a:prstGeom prst="rect">
+            <a:avLst/>
+          </a:prstGeom>
+          <a:noFill/>
+        </p:spPr>
+        <p:txBody>
+          <a:bodyPr wrap="square" rtlCol="0">
+            <a:spAutoFit/>
+          </a:bodyPr>
+          <a:lstStyle/>
+          <a:p>
+            <a:pPr marL="457200" indent="-457200">
+              <a:buFont typeface="Arial" panose="020B0604020202020204" pitchFamily="34" charset="0"/>
+              <a:buChar char="•"/>
+            </a:pPr>
+            <a:r>
+              <a:rPr lang="de-DE" sz="2000" dirty="0">
+                <a:solidFill>
+                  <a:schemeClr val="bg1"/>
+                </a:solidFill>
+                <a:latin typeface="Lato" panose="020F0502020204030203" pitchFamily="34" charset="0"/>
+                <a:ea typeface="Lato" panose="020F0502020204030203" pitchFamily="34" charset="0"/>
+                <a:cs typeface="Lato" panose="020F0502020204030203" pitchFamily="34" charset="0"/>
+              </a:rPr>
+              <a:t>Kick-Off</a:t>
+            </a:r>
+          </a:p>
+          <a:p>
+            <a:pPr marL="457200" indent="-457200">
+              <a:buFont typeface="Arial" panose="020B0604020202020204" pitchFamily="34" charset="0"/>
+              <a:buChar char="•"/>
+            </a:pPr>
+            <a:r>
+              <a:rPr lang="de-DE" sz="2000" dirty="0">
+                <a:solidFill>
+                  <a:schemeClr val="bg1"/>
+                </a:solidFill>
+                <a:latin typeface="Lato" panose="020F0502020204030203" pitchFamily="34" charset="0"/>
+                <a:ea typeface="Lato" panose="020F0502020204030203" pitchFamily="34" charset="0"/>
+                <a:cs typeface="Lato" panose="020F0502020204030203" pitchFamily="34" charset="0"/>
+              </a:rPr>
+              <a:t>Einführung und </a:t>
+            </a:r>
+            <a:r>
+              <a:rPr lang="de-DE" sz="2000" b="1" dirty="0">
+                <a:solidFill>
+                  <a:schemeClr val="bg1"/>
+                </a:solidFill>
+                <a:latin typeface="Lato" panose="020F0502020204030203" pitchFamily="34" charset="0"/>
+                <a:ea typeface="Lato" panose="020F0502020204030203" pitchFamily="34" charset="0"/>
+                <a:cs typeface="Lato" panose="020F0502020204030203" pitchFamily="34" charset="0"/>
+              </a:rPr>
+              <a:t>Rahmenbedingungen</a:t>
+            </a:r>
+            <a:r>
+              <a:rPr lang="de-DE" sz="2000" dirty="0">
+                <a:solidFill>
+                  <a:schemeClr val="bg1"/>
+                </a:solidFill>
+                <a:latin typeface="Lato" panose="020F0502020204030203" pitchFamily="34" charset="0"/>
+                <a:ea typeface="Lato" panose="020F0502020204030203" pitchFamily="34" charset="0"/>
+                <a:cs typeface="Lato" panose="020F0502020204030203" pitchFamily="34" charset="0"/>
+              </a:rPr>
+              <a:t> von </a:t>
+            </a:r>
+            <a:r>
+              <a:rPr lang="de-DE" sz="2000" b="1" dirty="0">
+                <a:solidFill>
+                  <a:schemeClr val="bg1"/>
+                </a:solidFill>
+                <a:latin typeface="Lato" panose="020F0502020204030203" pitchFamily="34" charset="0"/>
+                <a:ea typeface="Lato" panose="020F0502020204030203" pitchFamily="34" charset="0"/>
+                <a:cs typeface="Lato" panose="020F0502020204030203" pitchFamily="34" charset="0"/>
+              </a:rPr>
+              <a:t>DBD</a:t>
+            </a:r>
+          </a:p>
+          <a:p>
+            <a:pPr marL="457200" indent="-457200">
+              <a:buFont typeface="Arial" panose="020B0604020202020204" pitchFamily="34" charset="0"/>
+              <a:buChar char="•"/>
+            </a:pPr>
+            <a:r>
+              <a:rPr lang="de-DE" sz="2000" dirty="0">
+                <a:solidFill>
+                  <a:schemeClr val="bg1"/>
+                </a:solidFill>
+                <a:latin typeface="Lato" panose="020F0502020204030203" pitchFamily="34" charset="0"/>
+                <a:ea typeface="Lato" panose="020F0502020204030203" pitchFamily="34" charset="0"/>
+                <a:cs typeface="Lato" panose="020F0502020204030203" pitchFamily="34" charset="0"/>
+              </a:rPr>
+              <a:t>Grundlage der Arbeit mit </a:t>
+            </a:r>
+            <a:r>
+              <a:rPr lang="de-DE" sz="2000" b="1" dirty="0">
+                <a:solidFill>
+                  <a:schemeClr val="bg1"/>
+                </a:solidFill>
+                <a:latin typeface="Lato" panose="020F0502020204030203" pitchFamily="34" charset="0"/>
+                <a:ea typeface="Lato" panose="020F0502020204030203" pitchFamily="34" charset="0"/>
+                <a:cs typeface="Lato" panose="020F0502020204030203" pitchFamily="34" charset="0"/>
+              </a:rPr>
+              <a:t>R/</a:t>
+            </a:r>
+            <a:r>
+              <a:rPr lang="de-DE" sz="2000" b="1" dirty="0" err="1">
+                <a:solidFill>
+                  <a:schemeClr val="bg1"/>
+                </a:solidFill>
+                <a:latin typeface="Lato" panose="020F0502020204030203" pitchFamily="34" charset="0"/>
+                <a:ea typeface="Lato" panose="020F0502020204030203" pitchFamily="34" charset="0"/>
+                <a:cs typeface="Lato" panose="020F0502020204030203" pitchFamily="34" charset="0"/>
+              </a:rPr>
+              <a:t>RStudio</a:t>
+            </a:r>
+            <a:r>
+              <a:rPr lang="de-DE" sz="2000" b="1" dirty="0">
+                <a:solidFill>
+                  <a:schemeClr val="bg1"/>
+                </a:solidFill>
+                <a:latin typeface="Lato" panose="020F0502020204030203" pitchFamily="34" charset="0"/>
+                <a:ea typeface="Lato" panose="020F0502020204030203" pitchFamily="34" charset="0"/>
+                <a:cs typeface="Lato" panose="020F0502020204030203" pitchFamily="34" charset="0"/>
+              </a:rPr>
+              <a:t> im Kurs</a:t>
+            </a:r>
+          </a:p>
+          <a:p>
+            <a:r>
+              <a:rPr lang="de-DE" sz="2000" dirty="0">
+                <a:solidFill>
+                  <a:schemeClr val="bg1"/>
+                </a:solidFill>
+                <a:latin typeface="Lato" panose="020F0502020204030203" pitchFamily="34" charset="0"/>
+                <a:ea typeface="Lato" panose="020F0502020204030203" pitchFamily="34" charset="0"/>
+                <a:cs typeface="Lato" panose="020F0502020204030203" pitchFamily="34" charset="0"/>
+              </a:rPr>
+              <a:t> </a:t>
+            </a:r>
+          </a:p>
+          <a:p>
+            <a:endParaRPr lang="de-DE" sz="2000" dirty="0">
+              <a:latin typeface="News Cycle" panose="02000503000000000000" pitchFamily="2" charset="2"/>
+            </a:endParaRPr>
+          </a:p>
+        </p:txBody>
+      </p:sp>
+      <p:sp>
+        <p:nvSpPr>
+          <p:cNvPr id="12" name="Textfeld 11">
+            <a:extLst>
+              <a:ext uri="{FF2B5EF4-FFF2-40B4-BE49-F238E27FC236}">
+                <a16:creationId xmlns:a16="http://schemas.microsoft.com/office/drawing/2014/main" id="{437C124D-F6D5-9CE7-76FF-59E1990E89AC}"/>
+              </a:ext>
+            </a:extLst>
+          </p:cNvPr>
+          <p:cNvSpPr txBox="1"/>
+          <p:nvPr/>
+        </p:nvSpPr>
+        <p:spPr>
+          <a:xfrm>
+            <a:off x="4567971" y="1930503"/>
+            <a:ext cx="3056055" cy="2862322"/>
+          </a:xfrm>
+          <a:prstGeom prst="rect">
+            <a:avLst/>
+          </a:prstGeom>
+          <a:noFill/>
+        </p:spPr>
+        <p:txBody>
+          <a:bodyPr wrap="square" rtlCol="0">
+            <a:spAutoFit/>
+          </a:bodyPr>
+          <a:lstStyle/>
+          <a:p>
+            <a:r>
+              <a:rPr lang="de-DE" sz="2000" dirty="0">
+                <a:solidFill>
+                  <a:schemeClr val="bg1"/>
+                </a:solidFill>
+                <a:latin typeface="Lato" panose="020F0502020204030203" pitchFamily="34" charset="0"/>
+                <a:ea typeface="Lato" panose="020F0502020204030203" pitchFamily="34" charset="0"/>
+                <a:cs typeface="Lato" panose="020F0502020204030203" pitchFamily="34" charset="0"/>
+              </a:rPr>
+              <a:t>Beobachtung &amp; Analyse von </a:t>
+            </a:r>
+            <a:r>
+              <a:rPr lang="de-DE" sz="2000" b="1" dirty="0">
+                <a:solidFill>
+                  <a:schemeClr val="bg1"/>
+                </a:solidFill>
+                <a:latin typeface="Lato" panose="020F0502020204030203" pitchFamily="34" charset="0"/>
+                <a:ea typeface="Lato" panose="020F0502020204030203" pitchFamily="34" charset="0"/>
+                <a:cs typeface="Lato" panose="020F0502020204030203" pitchFamily="34" charset="0"/>
+              </a:rPr>
+              <a:t>schriftlichen </a:t>
+            </a:r>
+            <a:r>
+              <a:rPr lang="de-DE" sz="2000" b="1" dirty="0" err="1">
+                <a:solidFill>
+                  <a:schemeClr val="bg1"/>
+                </a:solidFill>
+                <a:latin typeface="Lato" panose="020F0502020204030203" pitchFamily="34" charset="0"/>
+                <a:ea typeface="Lato" panose="020F0502020204030203" pitchFamily="34" charset="0"/>
+                <a:cs typeface="Lato" panose="020F0502020204030203" pitchFamily="34" charset="0"/>
+              </a:rPr>
+              <a:t>Social</a:t>
+            </a:r>
+            <a:r>
+              <a:rPr lang="de-DE" sz="2000" b="1" dirty="0">
+                <a:solidFill>
+                  <a:schemeClr val="bg1"/>
+                </a:solidFill>
+                <a:latin typeface="Lato" panose="020F0502020204030203" pitchFamily="34" charset="0"/>
+                <a:ea typeface="Lato" panose="020F0502020204030203" pitchFamily="34" charset="0"/>
+                <a:cs typeface="Lato" panose="020F0502020204030203" pitchFamily="34" charset="0"/>
+              </a:rPr>
+              <a:t> Media Inhalten </a:t>
+            </a:r>
+            <a:r>
+              <a:rPr lang="de-DE" sz="2000" dirty="0">
+                <a:solidFill>
+                  <a:schemeClr val="bg1"/>
+                </a:solidFill>
+                <a:latin typeface="Lato" panose="020F0502020204030203" pitchFamily="34" charset="0"/>
+                <a:ea typeface="Lato" panose="020F0502020204030203" pitchFamily="34" charset="0"/>
+                <a:cs typeface="Lato" panose="020F0502020204030203" pitchFamily="34" charset="0"/>
+              </a:rPr>
+              <a:t>(z.B. Posts und/oder Hashtags) mit Hilfe </a:t>
+            </a:r>
+            <a:r>
+              <a:rPr lang="de-DE" sz="2000" b="1" dirty="0">
+                <a:solidFill>
+                  <a:schemeClr val="bg1"/>
+                </a:solidFill>
+                <a:latin typeface="Lato" panose="020F0502020204030203" pitchFamily="34" charset="0"/>
+                <a:ea typeface="Lato" panose="020F0502020204030203" pitchFamily="34" charset="0"/>
+                <a:cs typeface="Lato" panose="020F0502020204030203" pitchFamily="34" charset="0"/>
+              </a:rPr>
+              <a:t>verschiedener Methoden </a:t>
+            </a:r>
+            <a:r>
+              <a:rPr lang="de-DE" sz="2000" dirty="0">
+                <a:solidFill>
+                  <a:schemeClr val="bg1"/>
+                </a:solidFill>
+                <a:latin typeface="Lato" panose="020F0502020204030203" pitchFamily="34" charset="0"/>
+                <a:ea typeface="Lato" panose="020F0502020204030203" pitchFamily="34" charset="0"/>
+                <a:cs typeface="Lato" panose="020F0502020204030203" pitchFamily="34" charset="0"/>
+              </a:rPr>
+              <a:t>(z.B. Topic Modeling, Sentiment Analyse etc.)</a:t>
+            </a:r>
+          </a:p>
+          <a:p>
+            <a:endParaRPr lang="de-DE" sz="2000" dirty="0">
+              <a:latin typeface="News Cycle" panose="02000503000000000000" pitchFamily="2" charset="2"/>
+            </a:endParaRPr>
+          </a:p>
+        </p:txBody>
+      </p:sp>
+      <p:sp>
+        <p:nvSpPr>
+          <p:cNvPr id="13" name="Textfeld 12">
+            <a:extLst>
+              <a:ext uri="{FF2B5EF4-FFF2-40B4-BE49-F238E27FC236}">
+                <a16:creationId xmlns:a16="http://schemas.microsoft.com/office/drawing/2014/main" id="{A847A83F-2BB6-97E2-B748-DD0F1DE5AE5C}"/>
+              </a:ext>
+            </a:extLst>
+          </p:cNvPr>
+          <p:cNvSpPr txBox="1"/>
+          <p:nvPr/>
+        </p:nvSpPr>
+        <p:spPr>
+          <a:xfrm>
+            <a:off x="8663578" y="1930503"/>
+            <a:ext cx="3056055" cy="1631216"/>
+          </a:xfrm>
+          <a:prstGeom prst="rect">
+            <a:avLst/>
+          </a:prstGeom>
+          <a:noFill/>
+        </p:spPr>
+        <p:txBody>
+          <a:bodyPr wrap="square" rtlCol="0">
+            <a:spAutoFit/>
+          </a:bodyPr>
+          <a:lstStyle/>
+          <a:p>
+            <a:r>
+              <a:rPr lang="de-DE" sz="2000" b="0" i="0" dirty="0">
+                <a:solidFill>
+                  <a:schemeClr val="bg1"/>
+                </a:solidFill>
+                <a:effectLst/>
+                <a:latin typeface="Lato" panose="020F0502020204030203" pitchFamily="34" charset="0"/>
+              </a:rPr>
+              <a:t>Erhebung, Verarbeitung und Auswertung von </a:t>
+            </a:r>
+            <a:r>
+              <a:rPr lang="de-DE" sz="2000" b="1" i="0" dirty="0" err="1">
+                <a:solidFill>
+                  <a:schemeClr val="bg1"/>
+                </a:solidFill>
+                <a:effectLst/>
+                <a:latin typeface="Lato" panose="020F0502020204030203" pitchFamily="34" charset="0"/>
+              </a:rPr>
+              <a:t>Logging</a:t>
+            </a:r>
+            <a:r>
+              <a:rPr lang="de-DE" sz="2000" b="1" i="0" dirty="0">
+                <a:solidFill>
+                  <a:schemeClr val="bg1"/>
+                </a:solidFill>
+                <a:effectLst/>
+                <a:latin typeface="Lato" panose="020F0502020204030203" pitchFamily="34" charset="0"/>
+              </a:rPr>
+              <a:t>-Daten</a:t>
+            </a:r>
+            <a:r>
+              <a:rPr lang="de-DE" sz="2000" b="0" i="0" dirty="0">
+                <a:solidFill>
+                  <a:schemeClr val="bg1"/>
+                </a:solidFill>
+                <a:effectLst/>
+                <a:latin typeface="Lato" panose="020F0502020204030203" pitchFamily="34" charset="0"/>
+              </a:rPr>
+              <a:t> sowie deren </a:t>
+            </a:r>
+            <a:r>
+              <a:rPr lang="de-DE" sz="2000" b="1" i="0" dirty="0">
+                <a:solidFill>
+                  <a:schemeClr val="bg1"/>
+                </a:solidFill>
+                <a:effectLst/>
+                <a:latin typeface="Lato" panose="020F0502020204030203" pitchFamily="34" charset="0"/>
+              </a:rPr>
+              <a:t>Verknüpfung mit Umfragedaten</a:t>
+            </a:r>
+            <a:endParaRPr lang="de-DE" sz="2000" dirty="0">
+              <a:solidFill>
+                <a:schemeClr val="bg1"/>
+              </a:solidFill>
+              <a:latin typeface="News Cycle" panose="02000503000000000000" pitchFamily="2" charset="2"/>
+            </a:endParaRPr>
+          </a:p>
+        </p:txBody>
+      </p:sp>
+      <p:sp>
+        <p:nvSpPr>
+          <p:cNvPr id="14" name="Abgerundetes Rechteck 13">
+            <a:extLst>
+              <a:ext uri="{FF2B5EF4-FFF2-40B4-BE49-F238E27FC236}">
+                <a16:creationId xmlns:a16="http://schemas.microsoft.com/office/drawing/2014/main" id="{E59992D9-519D-A887-DFD0-E11745C0C00B}"/>
+              </a:ext>
+            </a:extLst>
+          </p:cNvPr>
+          <p:cNvSpPr/>
+          <p:nvPr/>
+        </p:nvSpPr>
+        <p:spPr>
+          <a:xfrm>
+            <a:off x="110394" y="5787187"/>
+            <a:ext cx="11971212" cy="720000"/>
+          </a:xfrm>
+          <a:prstGeom prst="roundRect">
+            <a:avLst/>
+          </a:prstGeom>
+          <a:solidFill>
+            <a:srgbClr val="04316A"/>
+          </a:solidFill>
+          <a:ln>
+            <a:noFill/>
+          </a:ln>
+          <a:effectLst>
+            <a:outerShdw blurRad="50800" dist="38100" dir="2700000" algn="tl" rotWithShape="0">
+              <a:prstClr val="black">
+                <a:alpha val="40000"/>
+              </a:prstClr>
+            </a:outerShdw>
+          </a:effectLst>
+        </p:spPr>
+        <p:style>
+          <a:lnRef idx="2">
+            <a:schemeClr val="accent1">
+              <a:shade val="15000"/>
+            </a:schemeClr>
+          </a:lnRef>
+          <a:fillRef idx="1">
+            <a:schemeClr val="accent1"/>
+          </a:fillRef>
+          <a:effectRef idx="0">
+            <a:schemeClr val="accent1"/>
+          </a:effectRef>
+          <a:fontRef idx="minor">
+            <a:schemeClr val="lt1"/>
+          </a:fontRef>
+        </p:style>
+        <p:txBody>
+          <a:bodyPr rtlCol="0" anchor="ctr"/>
+          <a:lstStyle/>
+          <a:p>
+            <a:pPr algn="ctr"/>
+            <a:endParaRPr lang="de-DE"/>
+          </a:p>
+        </p:txBody>
+      </p:sp>
+      <p:sp>
+        <p:nvSpPr>
+          <p:cNvPr id="15" name="Textfeld 14">
+            <a:extLst>
+              <a:ext uri="{FF2B5EF4-FFF2-40B4-BE49-F238E27FC236}">
+                <a16:creationId xmlns:a16="http://schemas.microsoft.com/office/drawing/2014/main" id="{685D4993-4735-6AD9-FA54-E7F39B66E503}"/>
+              </a:ext>
+            </a:extLst>
+          </p:cNvPr>
+          <p:cNvSpPr txBox="1"/>
+          <p:nvPr/>
+        </p:nvSpPr>
+        <p:spPr>
+          <a:xfrm>
+            <a:off x="4443199" y="5844259"/>
+            <a:ext cx="2467660" cy="646331"/>
+          </a:xfrm>
+          <a:prstGeom prst="rect">
+            <a:avLst/>
+          </a:prstGeom>
+          <a:noFill/>
+        </p:spPr>
+        <p:txBody>
+          <a:bodyPr wrap="square" rtlCol="0">
+            <a:spAutoFit/>
+          </a:bodyPr>
+          <a:lstStyle/>
+          <a:p>
+            <a:r>
+              <a:rPr lang="de-DE" sz="3600" b="1" dirty="0">
+                <a:solidFill>
+                  <a:schemeClr val="bg1"/>
+                </a:solidFill>
+                <a:latin typeface="News Cycle" panose="02000503000000000000" pitchFamily="2" charset="2"/>
+              </a:rPr>
+              <a:t>Arbeiten mit</a:t>
+            </a:r>
+          </a:p>
+        </p:txBody>
+      </p:sp>
+      <p:pic>
+        <p:nvPicPr>
+          <p:cNvPr id="17" name="Grafik 16">
+            <a:extLst>
+              <a:ext uri="{FF2B5EF4-FFF2-40B4-BE49-F238E27FC236}">
+                <a16:creationId xmlns:a16="http://schemas.microsoft.com/office/drawing/2014/main" id="{2197256E-1758-27DB-495C-5E5AFACA7985}"/>
+              </a:ext>
+            </a:extLst>
+          </p:cNvPr>
+          <p:cNvPicPr>
+            <a:picLocks noChangeAspect="1"/>
+          </p:cNvPicPr>
+          <p:nvPr/>
+        </p:nvPicPr>
+        <p:blipFill>
+          <a:blip r:embed="rId2">
+            <a:extLst>
+              <a:ext uri="{96DAC541-7B7A-43D3-8B79-37D633B846F1}">
+                <asvg:svgBlip xmlns:asvg="http://schemas.microsoft.com/office/drawing/2016/SVG/main" r:embed="rId3"/>
+              </a:ext>
+            </a:extLst>
+          </a:blip>
+          <a:stretch>
+            <a:fillRect/>
+          </a:stretch>
+        </p:blipFill>
+        <p:spPr>
+          <a:xfrm>
+            <a:off x="6910859" y="5685125"/>
+            <a:ext cx="997792" cy="997792"/>
           </a:xfrm>
           <a:prstGeom prst="rect">
             <a:avLst/>
@@ -4850,10 +5748,10 @@
       </p:pic>
       <p:pic>
         <p:nvPicPr>
-          <p:cNvPr id="15" name="Grafik 14">
-            <a:extLst>
-              <a:ext uri="{FF2B5EF4-FFF2-40B4-BE49-F238E27FC236}">
-                <a16:creationId xmlns:a16="http://schemas.microsoft.com/office/drawing/2014/main" id="{5F5FF996-4788-887B-223A-7B4DD5855100}"/>
+          <p:cNvPr id="19" name="Grafik 18" descr="Smartphone mit einfarbiger Füllung">
+            <a:extLst>
+              <a:ext uri="{FF2B5EF4-FFF2-40B4-BE49-F238E27FC236}">
+                <a16:creationId xmlns:a16="http://schemas.microsoft.com/office/drawing/2014/main" id="{EBFDD510-9E46-A49B-A8FB-29AEDF87E5FC}"/>
               </a:ext>
             </a:extLst>
           </p:cNvPr>
@@ -4863,15 +5761,93 @@
           <p:nvPr/>
         </p:nvPicPr>
         <p:blipFill>
-          <a:blip r:embed="rId3"/>
+          <a:blip r:embed="rId4">
+            <a:extLst>
+              <a:ext uri="{96DAC541-7B7A-43D3-8B79-37D633B846F1}">
+                <asvg:svgBlip xmlns:asvg="http://schemas.microsoft.com/office/drawing/2016/SVG/main" r:embed="rId5"/>
+              </a:ext>
+            </a:extLst>
+          </a:blip>
           <a:stretch>
             <a:fillRect/>
           </a:stretch>
         </p:blipFill>
         <p:spPr>
           <a:xfrm>
-            <a:off x="1316475" y="1832048"/>
-            <a:ext cx="3612206" cy="3064686"/>
+            <a:off x="10922451" y="684286"/>
+            <a:ext cx="720000" cy="720000"/>
+          </a:xfrm>
+          <a:prstGeom prst="rect">
+            <a:avLst/>
+          </a:prstGeom>
+        </p:spPr>
+      </p:pic>
+      <p:pic>
+        <p:nvPicPr>
+          <p:cNvPr id="21" name="Grafik 20" descr="Chatblase mit einfarbiger Füllung">
+            <a:extLst>
+              <a:ext uri="{FF2B5EF4-FFF2-40B4-BE49-F238E27FC236}">
+                <a16:creationId xmlns:a16="http://schemas.microsoft.com/office/drawing/2014/main" id="{1515B04B-A916-4593-E676-90028A3F5918}"/>
+              </a:ext>
+            </a:extLst>
+          </p:cNvPr>
+          <p:cNvPicPr>
+            <a:picLocks noChangeAspect="1"/>
+          </p:cNvPicPr>
+          <p:nvPr/>
+        </p:nvPicPr>
+        <p:blipFill>
+          <a:blip r:embed="rId6">
+            <a:extLst>
+              <a:ext uri="{96DAC541-7B7A-43D3-8B79-37D633B846F1}">
+                <asvg:svgBlip xmlns:asvg="http://schemas.microsoft.com/office/drawing/2016/SVG/main" r:embed="rId7"/>
+              </a:ext>
+            </a:extLst>
+          </a:blip>
+          <a:stretch>
+            <a:fillRect/>
+          </a:stretch>
+        </p:blipFill>
+        <p:spPr>
+          <a:xfrm>
+            <a:off x="6861102" y="684286"/>
+            <a:ext cx="720000" cy="720000"/>
+          </a:xfrm>
+          <a:prstGeom prst="rect">
+            <a:avLst/>
+          </a:prstGeom>
+        </p:spPr>
+      </p:pic>
+      <p:pic>
+        <p:nvPicPr>
+          <p:cNvPr id="23" name="Grafik 22" descr="Bücher mit einfarbiger Füllung">
+            <a:extLst>
+              <a:ext uri="{FF2B5EF4-FFF2-40B4-BE49-F238E27FC236}">
+                <a16:creationId xmlns:a16="http://schemas.microsoft.com/office/drawing/2014/main" id="{586B626D-9301-A3F6-0C30-1A9B90DBBEAF}"/>
+              </a:ext>
+            </a:extLst>
+          </p:cNvPr>
+          <p:cNvPicPr>
+            <a:picLocks noChangeAspect="1"/>
+          </p:cNvPicPr>
+          <p:nvPr/>
+        </p:nvPicPr>
+        <p:blipFill>
+          <a:blip r:embed="rId8">
+            <a:extLst>
+              <a:ext uri="{96DAC541-7B7A-43D3-8B79-37D633B846F1}">
+                <asvg:svgBlip xmlns:asvg="http://schemas.microsoft.com/office/drawing/2016/SVG/main" r:embed="rId9"/>
+              </a:ext>
+            </a:extLst>
+          </a:blip>
+          <a:stretch>
+            <a:fillRect/>
+          </a:stretch>
+        </p:blipFill>
+        <p:spPr>
+          <a:xfrm>
+            <a:off x="2992157" y="709006"/>
+            <a:ext cx="720000" cy="720000"/>
           </a:xfrm>
           <a:prstGeom prst="rect">
             <a:avLst/>
@@ -4881,7 +5857,7 @@
     </p:spTree>
     <p:extLst>
       <p:ext uri="{BB962C8B-B14F-4D97-AF65-F5344CB8AC3E}">
-        <p14:creationId xmlns:p14="http://schemas.microsoft.com/office/powerpoint/2010/main" val="1963786364"/>
+        <p14:creationId xmlns:p14="http://schemas.microsoft.com/office/powerpoint/2010/main" val="824126946"/>
       </p:ext>
     </p:extLst>
   </p:cSld>

</xml_diff>